<commit_message>
(Alterações nas apresentações 4, 5 e 6)
</commit_message>
<xml_diff>
--- a/Controlando versões com Git e Github - Capítulo IV.pptx
+++ b/Controlando versões com Git e Github - Capítulo IV.pptx
@@ -299,7 +299,7 @@
             <a:fld id="{08B9EBBA-996F-894A-B54A-D6246ED52CEA}" type="datetimeFigureOut">
               <a:rPr lang="en-US" smtClean="0"/>
               <a:pPr/>
-              <a:t>9/23/2020</a:t>
+              <a:t>9/30/2020</a:t>
             </a:fld>
             <a:endParaRPr lang="en-US" dirty="0"/>
           </a:p>
@@ -471,7 +471,7 @@
             <a:fld id="{C6C52C72-DE31-F449-A4ED-4C594FD91407}" type="datetimeFigureOut">
               <a:rPr lang="en-US" smtClean="0"/>
               <a:pPr/>
-              <a:t>9/23/2020</a:t>
+              <a:t>9/30/2020</a:t>
             </a:fld>
             <a:endParaRPr lang="en-US" dirty="0"/>
           </a:p>
@@ -653,7 +653,7 @@
             <a:fld id="{ED62726E-379B-B349-9EED-81ED093FA806}" type="datetimeFigureOut">
               <a:rPr lang="en-US" smtClean="0"/>
               <a:pPr/>
-              <a:t>9/23/2020</a:t>
+              <a:t>9/30/2020</a:t>
             </a:fld>
             <a:endParaRPr lang="en-US" dirty="0"/>
           </a:p>
@@ -825,7 +825,7 @@
             <a:fld id="{9B3A1323-8D79-1946-B0D7-40001CF92E9D}" type="datetimeFigureOut">
               <a:rPr lang="en-US" smtClean="0"/>
               <a:pPr/>
-              <a:t>9/23/2020</a:t>
+              <a:t>9/30/2020</a:t>
             </a:fld>
             <a:endParaRPr lang="en-US" dirty="0"/>
           </a:p>
@@ -1095,7 +1095,7 @@
             <a:fld id="{8DFA1846-DA80-1C48-A609-854EA85C59AD}" type="datetimeFigureOut">
               <a:rPr lang="en-US" smtClean="0"/>
               <a:pPr/>
-              <a:t>9/23/2020</a:t>
+              <a:t>9/30/2020</a:t>
             </a:fld>
             <a:endParaRPr lang="en-US" dirty="0"/>
           </a:p>
@@ -1329,7 +1329,7 @@
             <a:fld id="{57302355-E14B-8545-A8F8-0FE83CC9D524}" type="datetimeFigureOut">
               <a:rPr lang="en-US" smtClean="0"/>
               <a:pPr/>
-              <a:t>9/23/2020</a:t>
+              <a:t>9/30/2020</a:t>
             </a:fld>
             <a:endParaRPr lang="en-US" dirty="0"/>
           </a:p>
@@ -1690,7 +1690,7 @@
             <a:fld id="{09B482E8-6E0E-1B4F-B1FD-C69DB9E858D9}" type="datetimeFigureOut">
               <a:rPr lang="en-US" smtClean="0"/>
               <a:pPr/>
-              <a:t>9/23/2020</a:t>
+              <a:t>9/30/2020</a:t>
             </a:fld>
             <a:endParaRPr lang="en-US" dirty="0"/>
           </a:p>
@@ -1834,7 +1834,7 @@
             <a:fld id="{F13A34C8-038E-2045-AF43-DF7DBB8E0E9E}" type="datetimeFigureOut">
               <a:rPr lang="en-US" smtClean="0"/>
               <a:pPr/>
-              <a:t>9/23/2020</a:t>
+              <a:t>9/30/2020</a:t>
             </a:fld>
             <a:endParaRPr lang="en-US" dirty="0"/>
           </a:p>
@@ -1931,7 +1931,7 @@
             <a:fld id="{8818C68F-D26B-8F47-958C-23B49CF8A634}" type="datetimeFigureOut">
               <a:rPr lang="en-US" smtClean="0"/>
               <a:pPr/>
-              <a:t>9/23/2020</a:t>
+              <a:t>9/30/2020</a:t>
             </a:fld>
             <a:endParaRPr lang="en-US" dirty="0"/>
           </a:p>
@@ -2290,7 +2290,7 @@
             <a:fld id="{D0DF5E60-9974-AC48-9591-99C2BB44B7CF}" type="datetimeFigureOut">
               <a:rPr lang="en-US" smtClean="0"/>
               <a:pPr/>
-              <a:t>9/23/2020</a:t>
+              <a:t>9/30/2020</a:t>
             </a:fld>
             <a:endParaRPr lang="en-US" dirty="0"/>
           </a:p>
@@ -2651,7 +2651,7 @@
             <a:fld id="{09B482E8-6E0E-1B4F-B1FD-C69DB9E858D9}" type="datetimeFigureOut">
               <a:rPr lang="en-US" smtClean="0"/>
               <a:pPr/>
-              <a:t>9/23/2020</a:t>
+              <a:t>9/30/2020</a:t>
             </a:fld>
             <a:endParaRPr lang="en-US" dirty="0"/>
           </a:p>
@@ -2898,7 +2898,7 @@
             <a:fld id="{09B482E8-6E0E-1B4F-B1FD-C69DB9E858D9}" type="datetimeFigureOut">
               <a:rPr lang="en-US" smtClean="0"/>
               <a:pPr/>
-              <a:t>9/23/2020</a:t>
+              <a:t>9/30/2020</a:t>
             </a:fld>
             <a:endParaRPr lang="en-US" dirty="0"/>
           </a:p>
@@ -3371,7 +3371,7 @@
           <p:cNvPr id="4" name="Title 1">
             <a:extLst>
               <a:ext uri="{FF2B5EF4-FFF2-40B4-BE49-F238E27FC236}">
-                <a16:creationId xmlns="" xmlns:a16="http://schemas.microsoft.com/office/drawing/2014/main" id="{854162F5-84C3-E248-B56A-B760B2963C40}"/>
+                <a16:creationId xmlns:a16="http://schemas.microsoft.com/office/drawing/2014/main" xmlns="" id="{854162F5-84C3-E248-B56A-B760B2963C40}"/>
               </a:ext>
             </a:extLst>
           </p:cNvPr>
@@ -3471,7 +3471,7 @@
           <p:cNvPr id="4" name="TextBox 3">
             <a:extLst>
               <a:ext uri="{FF2B5EF4-FFF2-40B4-BE49-F238E27FC236}">
-                <a16:creationId xmlns="" xmlns:a16="http://schemas.microsoft.com/office/drawing/2014/main" id="{B2C256AF-F888-3B4A-87A3-D123362DC6A8}"/>
+                <a16:creationId xmlns:a16="http://schemas.microsoft.com/office/drawing/2014/main" xmlns="" id="{B2C256AF-F888-3B4A-87A3-D123362DC6A8}"/>
               </a:ext>
             </a:extLst>
           </p:cNvPr>
@@ -3852,7 +3852,7 @@
           <p:cNvPr id="4" name="TextBox 3">
             <a:extLst>
               <a:ext uri="{FF2B5EF4-FFF2-40B4-BE49-F238E27FC236}">
-                <a16:creationId xmlns="" xmlns:a16="http://schemas.microsoft.com/office/drawing/2014/main" id="{B2C256AF-F888-3B4A-87A3-D123362DC6A8}"/>
+                <a16:creationId xmlns:a16="http://schemas.microsoft.com/office/drawing/2014/main" xmlns="" id="{B2C256AF-F888-3B4A-87A3-D123362DC6A8}"/>
               </a:ext>
             </a:extLst>
           </p:cNvPr>
@@ -4073,7 +4073,7 @@
           <p:cNvPr id="3" name="Picture 2">
             <a:extLst>
               <a:ext uri="{FF2B5EF4-FFF2-40B4-BE49-F238E27FC236}">
-                <a16:creationId xmlns="" xmlns:a16="http://schemas.microsoft.com/office/drawing/2014/main" id="{5C1A8028-E75B-7C4B-AA70-BECB01D5889E}"/>
+                <a16:creationId xmlns:a16="http://schemas.microsoft.com/office/drawing/2014/main" xmlns="" id="{5C1A8028-E75B-7C4B-AA70-BECB01D5889E}"/>
               </a:ext>
             </a:extLst>
           </p:cNvPr>
@@ -4175,7 +4175,7 @@
           <p:cNvPr id="4" name="TextBox 3">
             <a:extLst>
               <a:ext uri="{FF2B5EF4-FFF2-40B4-BE49-F238E27FC236}">
-                <a16:creationId xmlns="" xmlns:a16="http://schemas.microsoft.com/office/drawing/2014/main" id="{B2C256AF-F888-3B4A-87A3-D123362DC6A8}"/>
+                <a16:creationId xmlns:a16="http://schemas.microsoft.com/office/drawing/2014/main" xmlns="" id="{B2C256AF-F888-3B4A-87A3-D123362DC6A8}"/>
               </a:ext>
             </a:extLst>
           </p:cNvPr>
@@ -4563,7 +4563,7 @@
           <p:cNvPr id="4" name="TextBox 3">
             <a:extLst>
               <a:ext uri="{FF2B5EF4-FFF2-40B4-BE49-F238E27FC236}">
-                <a16:creationId xmlns="" xmlns:a16="http://schemas.microsoft.com/office/drawing/2014/main" id="{B2C256AF-F888-3B4A-87A3-D123362DC6A8}"/>
+                <a16:creationId xmlns:a16="http://schemas.microsoft.com/office/drawing/2014/main" xmlns="" id="{B2C256AF-F888-3B4A-87A3-D123362DC6A8}"/>
               </a:ext>
             </a:extLst>
           </p:cNvPr>
@@ -4573,7 +4573,7 @@
         <p:spPr>
           <a:xfrm>
             <a:off x="475989" y="1597729"/>
-            <a:ext cx="8192022" cy="4524315"/>
+            <a:ext cx="8192022" cy="4031873"/>
           </a:xfrm>
           <a:prstGeom prst="rect">
             <a:avLst/>
@@ -4586,17 +4586,17 @@
           </a:bodyPr>
           <a:lstStyle/>
           <a:p>
-            <a:pPr algn="just"/>
-            <a:endParaRPr lang="pt-BR" sz="3200" dirty="0"/>
-          </a:p>
-          <a:p>
             <a:pPr marL="457200" indent="-457200" algn="just">
               <a:buFont typeface="Arial" panose="020B0604020202020204" pitchFamily="34" charset="0"/>
               <a:buChar char="•"/>
             </a:pPr>
             <a:r>
+              <a:rPr lang="pt-BR" sz="2800" dirty="0" smtClean="0"/>
+              <a:t>Realizado </a:t>
+            </a:r>
+            <a:r>
               <a:rPr lang="pt-BR" sz="2800" dirty="0"/>
-              <a:t>Realizado através do comando </a:t>
+              <a:t>através do comando </a:t>
             </a:r>
             <a:r>
               <a:rPr lang="pt-BR" sz="2800" i="1" dirty="0" err="1">
@@ -4785,7 +4785,6 @@
               <a:rPr lang="pt-BR" sz="2800" dirty="0"/>
               <a:t>.</a:t>
             </a:r>
-            <a:endParaRPr lang="pt-BR" sz="2800" dirty="0"/>
           </a:p>
         </p:txBody>
       </p:sp>
@@ -4854,7 +4853,7 @@
           <p:cNvPr id="4" name="TextBox 3">
             <a:extLst>
               <a:ext uri="{FF2B5EF4-FFF2-40B4-BE49-F238E27FC236}">
-                <a16:creationId xmlns="" xmlns:a16="http://schemas.microsoft.com/office/drawing/2014/main" id="{B2C256AF-F888-3B4A-87A3-D123362DC6A8}"/>
+                <a16:creationId xmlns:a16="http://schemas.microsoft.com/office/drawing/2014/main" xmlns="" id="{B2C256AF-F888-3B4A-87A3-D123362DC6A8}"/>
               </a:ext>
             </a:extLst>
           </p:cNvPr>
@@ -4864,7 +4863,7 @@
         <p:spPr>
           <a:xfrm>
             <a:off x="475989" y="1089898"/>
-            <a:ext cx="8192022" cy="4585871"/>
+            <a:ext cx="8192022" cy="4185761"/>
           </a:xfrm>
           <a:prstGeom prst="rect">
             <a:avLst/>
@@ -4879,13 +4878,6 @@
           <a:p>
             <a:pPr algn="just"/>
             <a:endParaRPr lang="pt-BR" sz="3200" b="1" dirty="0"/>
-          </a:p>
-          <a:p>
-            <a:pPr marL="457200" indent="-457200" algn="just">
-              <a:buFont typeface="Arial" panose="020B0604020202020204" pitchFamily="34" charset="0"/>
-              <a:buChar char="•"/>
-            </a:pPr>
-            <a:endParaRPr lang="pt-BR" sz="2600" dirty="0" smtClean="0"/>
           </a:p>
           <a:p>
             <a:pPr marL="457200" indent="-457200" algn="just">
@@ -5078,7 +5070,7 @@
           <p:cNvPr id="3" name="Picture 2">
             <a:extLst>
               <a:ext uri="{FF2B5EF4-FFF2-40B4-BE49-F238E27FC236}">
-                <a16:creationId xmlns="" xmlns:a16="http://schemas.microsoft.com/office/drawing/2014/main" id="{ACC17C2A-8EF8-1141-9B13-E4F3F2D20033}"/>
+                <a16:creationId xmlns:a16="http://schemas.microsoft.com/office/drawing/2014/main" xmlns="" id="{ACC17C2A-8EF8-1141-9B13-E4F3F2D20033}"/>
               </a:ext>
             </a:extLst>
           </p:cNvPr>
@@ -5167,7 +5159,7 @@
           <p:cNvPr id="4" name="TextBox 3">
             <a:extLst>
               <a:ext uri="{FF2B5EF4-FFF2-40B4-BE49-F238E27FC236}">
-                <a16:creationId xmlns="" xmlns:a16="http://schemas.microsoft.com/office/drawing/2014/main" id="{B2C256AF-F888-3B4A-87A3-D123362DC6A8}"/>
+                <a16:creationId xmlns:a16="http://schemas.microsoft.com/office/drawing/2014/main" xmlns="" id="{B2C256AF-F888-3B4A-87A3-D123362DC6A8}"/>
               </a:ext>
             </a:extLst>
           </p:cNvPr>
@@ -5177,7 +5169,7 @@
         <p:spPr>
           <a:xfrm>
             <a:off x="475989" y="1382286"/>
-            <a:ext cx="8192022" cy="3231654"/>
+            <a:ext cx="8192022" cy="4093428"/>
           </a:xfrm>
           <a:prstGeom prst="rect">
             <a:avLst/>
@@ -5268,8 +5260,27 @@
             </a:r>
             <a:r>
               <a:rPr lang="pt-BR" sz="2800" dirty="0"/>
-              <a:t>a ser atualizada.</a:t>
-            </a:r>
+              <a:t>a ser atualizada</a:t>
+            </a:r>
+            <a:r>
+              <a:rPr lang="pt-BR" sz="2800" dirty="0" smtClean="0"/>
+              <a:t>.</a:t>
+            </a:r>
+          </a:p>
+          <a:p>
+            <a:pPr marL="457200" indent="-457200" algn="just">
+              <a:buFont typeface="Arial" panose="020B0604020202020204" pitchFamily="34" charset="0"/>
+              <a:buChar char="•"/>
+            </a:pPr>
+            <a:r>
+              <a:rPr lang="pt-BR" sz="2800" dirty="0" smtClean="0"/>
+              <a:t>No sentido de atualizar o repositório local com dados modificados </a:t>
+            </a:r>
+            <a:r>
+              <a:rPr lang="pt-BR" sz="2800" smtClean="0"/>
+              <a:t>do repositório remoto.</a:t>
+            </a:r>
+            <a:endParaRPr lang="pt-BR" sz="2800" dirty="0"/>
           </a:p>
           <a:p>
             <a:pPr algn="just"/>
@@ -5406,7 +5417,7 @@
           <p:cNvPr id="2" name="Picture 2" descr="Git Pull | Pull Request - javatpoint">
             <a:extLst>
               <a:ext uri="{FF2B5EF4-FFF2-40B4-BE49-F238E27FC236}">
-                <a16:creationId xmlns="" xmlns:a16="http://schemas.microsoft.com/office/drawing/2014/main" id="{0B79C56F-A39B-174A-BAA8-C4EAD04A73AD}"/>
+                <a16:creationId xmlns:a16="http://schemas.microsoft.com/office/drawing/2014/main" xmlns="" id="{0B79C56F-A39B-174A-BAA8-C4EAD04A73AD}"/>
               </a:ext>
             </a:extLst>
           </p:cNvPr>
@@ -5521,7 +5532,7 @@
           <p:cNvPr id="4" name="TextBox 3">
             <a:extLst>
               <a:ext uri="{FF2B5EF4-FFF2-40B4-BE49-F238E27FC236}">
-                <a16:creationId xmlns="" xmlns:a16="http://schemas.microsoft.com/office/drawing/2014/main" id="{B2C256AF-F888-3B4A-87A3-D123362DC6A8}"/>
+                <a16:creationId xmlns:a16="http://schemas.microsoft.com/office/drawing/2014/main" xmlns="" id="{B2C256AF-F888-3B4A-87A3-D123362DC6A8}"/>
               </a:ext>
             </a:extLst>
           </p:cNvPr>
@@ -5673,7 +5684,7 @@
           <p:cNvPr id="2" name="Title 1">
             <a:extLst>
               <a:ext uri="{FF2B5EF4-FFF2-40B4-BE49-F238E27FC236}">
-                <a16:creationId xmlns="" xmlns:a16="http://schemas.microsoft.com/office/drawing/2014/main" id="{73FD4F77-028A-7A47-BC41-2C419FC56E27}"/>
+                <a16:creationId xmlns:a16="http://schemas.microsoft.com/office/drawing/2014/main" xmlns="" id="{73FD4F77-028A-7A47-BC41-2C419FC56E27}"/>
               </a:ext>
             </a:extLst>
           </p:cNvPr>
@@ -5711,7 +5722,7 @@
           <p:cNvPr id="1026" name="Picture 2" descr="Git na prática — Parte 1 (Subindo projeto para o github).">
             <a:extLst>
               <a:ext uri="{FF2B5EF4-FFF2-40B4-BE49-F238E27FC236}">
-                <a16:creationId xmlns="" xmlns:a16="http://schemas.microsoft.com/office/drawing/2014/main" id="{C41C7762-29AF-DE4A-8B75-0AA40134A4CA}"/>
+                <a16:creationId xmlns:a16="http://schemas.microsoft.com/office/drawing/2014/main" xmlns="" id="{C41C7762-29AF-DE4A-8B75-0AA40134A4CA}"/>
               </a:ext>
             </a:extLst>
           </p:cNvPr>
@@ -5788,7 +5799,7 @@
           <p:cNvPr id="4" name="TextBox 3">
             <a:extLst>
               <a:ext uri="{FF2B5EF4-FFF2-40B4-BE49-F238E27FC236}">
-                <a16:creationId xmlns="" xmlns:a16="http://schemas.microsoft.com/office/drawing/2014/main" id="{B2C256AF-F888-3B4A-87A3-D123362DC6A8}"/>
+                <a16:creationId xmlns:a16="http://schemas.microsoft.com/office/drawing/2014/main" xmlns="" id="{B2C256AF-F888-3B4A-87A3-D123362DC6A8}"/>
               </a:ext>
             </a:extLst>
           </p:cNvPr>
@@ -5868,11 +5879,7 @@
           <a:p>
             <a:r>
               <a:rPr lang="pt-BR" sz="2400" b="1" dirty="0" smtClean="0"/>
-              <a:t>PROTOCOLO </a:t>
-            </a:r>
-            <a:r>
-              <a:rPr lang="pt-BR" sz="2400" b="1" dirty="0" smtClean="0"/>
-              <a:t>local</a:t>
+              <a:t>PROTOCOLO local</a:t>
             </a:r>
             <a:endParaRPr lang="pt-BR" sz="2400" dirty="0"/>
           </a:p>
@@ -5913,7 +5920,7 @@
           <p:cNvPr id="4" name="TextBox 3">
             <a:extLst>
               <a:ext uri="{FF2B5EF4-FFF2-40B4-BE49-F238E27FC236}">
-                <a16:creationId xmlns="" xmlns:a16="http://schemas.microsoft.com/office/drawing/2014/main" id="{B2C256AF-F888-3B4A-87A3-D123362DC6A8}"/>
+                <a16:creationId xmlns:a16="http://schemas.microsoft.com/office/drawing/2014/main" xmlns="" id="{B2C256AF-F888-3B4A-87A3-D123362DC6A8}"/>
               </a:ext>
             </a:extLst>
           </p:cNvPr>
@@ -5981,11 +5988,7 @@
           <a:p>
             <a:r>
               <a:rPr lang="pt-BR" sz="2400" b="1" dirty="0" smtClean="0"/>
-              <a:t>PROTOCOLO </a:t>
-            </a:r>
-            <a:r>
-              <a:rPr lang="pt-BR" sz="2400" b="1" dirty="0" smtClean="0"/>
-              <a:t>local</a:t>
+              <a:t>PROTOCOLO local</a:t>
             </a:r>
             <a:endParaRPr lang="pt-BR" sz="2400" dirty="0"/>
           </a:p>
@@ -6026,7 +6029,7 @@
           <p:cNvPr id="4" name="TextBox 3">
             <a:extLst>
               <a:ext uri="{FF2B5EF4-FFF2-40B4-BE49-F238E27FC236}">
-                <a16:creationId xmlns="" xmlns:a16="http://schemas.microsoft.com/office/drawing/2014/main" id="{B2C256AF-F888-3B4A-87A3-D123362DC6A8}"/>
+                <a16:creationId xmlns:a16="http://schemas.microsoft.com/office/drawing/2014/main" xmlns="" id="{B2C256AF-F888-3B4A-87A3-D123362DC6A8}"/>
               </a:ext>
             </a:extLst>
           </p:cNvPr>
@@ -6199,7 +6202,7 @@
           <p:cNvPr id="4" name="TextBox 3">
             <a:extLst>
               <a:ext uri="{FF2B5EF4-FFF2-40B4-BE49-F238E27FC236}">
-                <a16:creationId xmlns="" xmlns:a16="http://schemas.microsoft.com/office/drawing/2014/main" id="{B2C256AF-F888-3B4A-87A3-D123362DC6A8}"/>
+                <a16:creationId xmlns:a16="http://schemas.microsoft.com/office/drawing/2014/main" xmlns="" id="{B2C256AF-F888-3B4A-87A3-D123362DC6A8}"/>
               </a:ext>
             </a:extLst>
           </p:cNvPr>
@@ -6341,7 +6344,7 @@
         </p:nvSpPr>
         <p:spPr>
           <a:xfrm>
-            <a:off x="180304" y="11655"/>
+            <a:off x="180304" y="0"/>
             <a:ext cx="8770513" cy="902745"/>
           </a:xfrm>
         </p:spPr>
@@ -6394,7 +6397,7 @@
           <p:cNvPr id="4" name="TextBox 3">
             <a:extLst>
               <a:ext uri="{FF2B5EF4-FFF2-40B4-BE49-F238E27FC236}">
-                <a16:creationId xmlns="" xmlns:a16="http://schemas.microsoft.com/office/drawing/2014/main" id="{B2C256AF-F888-3B4A-87A3-D123362DC6A8}"/>
+                <a16:creationId xmlns:a16="http://schemas.microsoft.com/office/drawing/2014/main" xmlns="" id="{B2C256AF-F888-3B4A-87A3-D123362DC6A8}"/>
               </a:ext>
             </a:extLst>
           </p:cNvPr>
@@ -6668,7 +6671,7 @@
           <p:cNvPr id="1026" name="Picture 2" descr="Git na prática — Parte 1 (Subindo projeto para o github).">
             <a:extLst>
               <a:ext uri="{FF2B5EF4-FFF2-40B4-BE49-F238E27FC236}">
-                <a16:creationId xmlns="" xmlns:a16="http://schemas.microsoft.com/office/drawing/2014/main" id="{C41C7762-29AF-DE4A-8B75-0AA40134A4CA}"/>
+                <a16:creationId xmlns:a16="http://schemas.microsoft.com/office/drawing/2014/main" xmlns="" id="{C41C7762-29AF-DE4A-8B75-0AA40134A4CA}"/>
               </a:ext>
             </a:extLst>
           </p:cNvPr>
@@ -6715,7 +6718,7 @@
           <p:cNvPr id="5" name="Picture 2" descr="Unidade Add a Salesforce DX Project to Source Control | Salesforce">
             <a:extLst>
               <a:ext uri="{FF2B5EF4-FFF2-40B4-BE49-F238E27FC236}">
-                <a16:creationId xmlns="" xmlns:a16="http://schemas.microsoft.com/office/drawing/2014/main" id="{3D024DCA-C6DA-304A-886E-D0361051E10F}"/>
+                <a16:creationId xmlns:a16="http://schemas.microsoft.com/office/drawing/2014/main" xmlns="" id="{3D024DCA-C6DA-304A-886E-D0361051E10F}"/>
               </a:ext>
             </a:extLst>
           </p:cNvPr>
@@ -6827,7 +6830,7 @@
           <p:cNvPr id="6" name="TextBox 5">
             <a:extLst>
               <a:ext uri="{FF2B5EF4-FFF2-40B4-BE49-F238E27FC236}">
-                <a16:creationId xmlns="" xmlns:a16="http://schemas.microsoft.com/office/drawing/2014/main" id="{7465116B-E458-8C4B-B4C7-020FCECB7D8A}"/>
+                <a16:creationId xmlns:a16="http://schemas.microsoft.com/office/drawing/2014/main" xmlns="" id="{7465116B-E458-8C4B-B4C7-020FCECB7D8A}"/>
               </a:ext>
             </a:extLst>
           </p:cNvPr>
@@ -6875,8 +6878,16 @@
               <a:buChar char="•"/>
             </a:pPr>
             <a:r>
+              <a:rPr lang="pt-BR" sz="2800" dirty="0">
+                <a:solidFill>
+                  <a:srgbClr val="FF0000"/>
+                </a:solidFill>
+              </a:rPr>
+              <a:t>Backups</a:t>
+            </a:r>
+            <a:r>
               <a:rPr lang="pt-BR" sz="2800" dirty="0"/>
-              <a:t>Backups demandam trabalho e estão sujeito a falhas.</a:t>
+              <a:t> demandam trabalho e estão sujeito a falhas.</a:t>
             </a:r>
           </a:p>
           <a:p>
@@ -6961,7 +6972,7 @@
           <p:cNvPr id="4" name="TextBox 3">
             <a:extLst>
               <a:ext uri="{FF2B5EF4-FFF2-40B4-BE49-F238E27FC236}">
-                <a16:creationId xmlns="" xmlns:a16="http://schemas.microsoft.com/office/drawing/2014/main" id="{B2C256AF-F888-3B4A-87A3-D123362DC6A8}"/>
+                <a16:creationId xmlns:a16="http://schemas.microsoft.com/office/drawing/2014/main" xmlns="" id="{B2C256AF-F888-3B4A-87A3-D123362DC6A8}"/>
               </a:ext>
             </a:extLst>
           </p:cNvPr>
@@ -7015,12 +7026,8 @@
               <a:t>Os integrantes de </a:t>
             </a:r>
             <a:r>
-              <a:rPr lang="pt-BR" sz="2600" dirty="0" err="1" smtClean="0"/>
-              <a:t>umma</a:t>
-            </a:r>
-            <a:r>
               <a:rPr lang="pt-BR" sz="2600" dirty="0" smtClean="0"/>
-              <a:t> </a:t>
+              <a:t>uma </a:t>
             </a:r>
             <a:r>
               <a:rPr lang="pt-BR" sz="2600" dirty="0"/>
@@ -7125,7 +7132,7 @@
           <p:cNvPr id="4" name="TextBox 3">
             <a:extLst>
               <a:ext uri="{FF2B5EF4-FFF2-40B4-BE49-F238E27FC236}">
-                <a16:creationId xmlns="" xmlns:a16="http://schemas.microsoft.com/office/drawing/2014/main" id="{B2C256AF-F888-3B4A-87A3-D123362DC6A8}"/>
+                <a16:creationId xmlns:a16="http://schemas.microsoft.com/office/drawing/2014/main" xmlns="" id="{B2C256AF-F888-3B4A-87A3-D123362DC6A8}"/>
               </a:ext>
             </a:extLst>
           </p:cNvPr>
@@ -7161,20 +7168,40 @@
               <a:t>Um repositório remoto é criado com o comando </a:t>
             </a:r>
             <a:r>
-              <a:rPr lang="pt-BR" sz="2600" i="1" dirty="0" err="1"/>
+              <a:rPr lang="pt-BR" sz="2600" i="1" dirty="0" err="1">
+                <a:solidFill>
+                  <a:srgbClr val="FF0000"/>
+                </a:solidFill>
+              </a:rPr>
               <a:t>git</a:t>
             </a:r>
             <a:r>
-              <a:rPr lang="pt-BR" sz="2600" i="1" dirty="0"/>
+              <a:rPr lang="pt-BR" sz="2600" i="1" dirty="0">
+                <a:solidFill>
+                  <a:srgbClr val="FF0000"/>
+                </a:solidFill>
+              </a:rPr>
               <a:t> </a:t>
             </a:r>
             <a:r>
-              <a:rPr lang="pt-BR" sz="2600" i="1" dirty="0" err="1"/>
+              <a:rPr lang="pt-BR" sz="2600" i="1" dirty="0" err="1">
+                <a:solidFill>
+                  <a:srgbClr val="FF0000"/>
+                </a:solidFill>
+              </a:rPr>
               <a:t>init</a:t>
             </a:r>
             <a:r>
+              <a:rPr lang="pt-BR" sz="2600" dirty="0">
+                <a:solidFill>
+                  <a:srgbClr val="FF0000"/>
+                </a:solidFill>
+              </a:rPr>
+              <a:t> </a:t>
+            </a:r>
+            <a:r>
               <a:rPr lang="pt-BR" sz="2600" dirty="0"/>
-              <a:t> com o parâmetro </a:t>
+              <a:t>com o parâmetro </a:t>
             </a:r>
             <a:r>
               <a:rPr lang="pt-BR" sz="2600" dirty="0">
@@ -7349,7 +7376,7 @@
           <p:cNvPr id="4" name="TextBox 3">
             <a:extLst>
               <a:ext uri="{FF2B5EF4-FFF2-40B4-BE49-F238E27FC236}">
-                <a16:creationId xmlns="" xmlns:a16="http://schemas.microsoft.com/office/drawing/2014/main" id="{B2C256AF-F888-3B4A-87A3-D123362DC6A8}"/>
+                <a16:creationId xmlns:a16="http://schemas.microsoft.com/office/drawing/2014/main" xmlns="" id="{B2C256AF-F888-3B4A-87A3-D123362DC6A8}"/>
               </a:ext>
             </a:extLst>
           </p:cNvPr>
@@ -7566,7 +7593,7 @@
           <p:cNvPr id="4" name="TextBox 3">
             <a:extLst>
               <a:ext uri="{FF2B5EF4-FFF2-40B4-BE49-F238E27FC236}">
-                <a16:creationId xmlns="" xmlns:a16="http://schemas.microsoft.com/office/drawing/2014/main" id="{B2C256AF-F888-3B4A-87A3-D123362DC6A8}"/>
+                <a16:creationId xmlns:a16="http://schemas.microsoft.com/office/drawing/2014/main" xmlns="" id="{B2C256AF-F888-3B4A-87A3-D123362DC6A8}"/>
               </a:ext>
             </a:extLst>
           </p:cNvPr>
@@ -7671,7 +7698,19 @@
             </a:r>
             <a:r>
               <a:rPr lang="pt-BR" sz="2800" dirty="0"/>
-              <a:t>do repositório, e em seguida a URL do repositório.</a:t>
+              <a:t>do repositório, e em seguida a </a:t>
+            </a:r>
+            <a:r>
+              <a:rPr lang="pt-BR" sz="2800" dirty="0">
+                <a:solidFill>
+                  <a:srgbClr val="FF0000"/>
+                </a:solidFill>
+              </a:rPr>
+              <a:t>URL</a:t>
+            </a:r>
+            <a:r>
+              <a:rPr lang="pt-BR" sz="2800" dirty="0"/>
+              <a:t> do repositório.</a:t>
             </a:r>
           </a:p>
           <a:p>
@@ -7733,7 +7772,23 @@
                   <a:srgbClr val="FF0000"/>
                 </a:solidFill>
               </a:rPr>
-              <a:t> servidor file://</a:t>
+              <a:t> </a:t>
+            </a:r>
+            <a:r>
+              <a:rPr lang="pt-BR" sz="2000" dirty="0">
+                <a:solidFill>
+                  <a:srgbClr val="002060"/>
+                </a:solidFill>
+              </a:rPr>
+              <a:t>servidor</a:t>
+            </a:r>
+            <a:r>
+              <a:rPr lang="pt-BR" sz="2000" dirty="0">
+                <a:solidFill>
+                  <a:srgbClr val="FF0000"/>
+                </a:solidFill>
+              </a:rPr>
+              <a:t> file://</a:t>
             </a:r>
             <a:r>
               <a:rPr lang="pt-BR" sz="2000" dirty="0" smtClean="0">
@@ -7820,7 +7875,7 @@
           <p:cNvPr id="4" name="TextBox 3">
             <a:extLst>
               <a:ext uri="{FF2B5EF4-FFF2-40B4-BE49-F238E27FC236}">
-                <a16:creationId xmlns="" xmlns:a16="http://schemas.microsoft.com/office/drawing/2014/main" id="{B2C256AF-F888-3B4A-87A3-D123362DC6A8}"/>
+                <a16:creationId xmlns:a16="http://schemas.microsoft.com/office/drawing/2014/main" xmlns="" id="{B2C256AF-F888-3B4A-87A3-D123362DC6A8}"/>
               </a:ext>
             </a:extLst>
           </p:cNvPr>
@@ -7861,7 +7916,7 @@
               <a:t> , e o repositório remoto do nosso projeto tenha sido criado no diretório </a:t>
             </a:r>
             <a:r>
-              <a:rPr lang="pt-BR" sz="2800" dirty="0">
+              <a:rPr lang="pt-BR" sz="2800" dirty="0" smtClean="0">
                 <a:solidFill>
                   <a:srgbClr val="FF0000"/>
                 </a:solidFill>
@@ -7917,28 +7972,56 @@
               <a:t>adicionarmos o repositório remoto devemos executar o comando </a:t>
             </a:r>
             <a:r>
-              <a:rPr lang="pt-BR" sz="2800" dirty="0" err="1"/>
+              <a:rPr lang="pt-BR" sz="2800" dirty="0" err="1">
+                <a:solidFill>
+                  <a:srgbClr val="FF0000"/>
+                </a:solidFill>
+              </a:rPr>
               <a:t>git</a:t>
             </a:r>
             <a:r>
+              <a:rPr lang="pt-BR" sz="2800" dirty="0">
+                <a:solidFill>
+                  <a:srgbClr val="FF0000"/>
+                </a:solidFill>
+              </a:rPr>
+              <a:t> </a:t>
+            </a:r>
+            <a:r>
+              <a:rPr lang="pt-BR" sz="2800" dirty="0" err="1">
+                <a:solidFill>
+                  <a:srgbClr val="FF0000"/>
+                </a:solidFill>
+              </a:rPr>
+              <a:t>remote</a:t>
+            </a:r>
+            <a:r>
+              <a:rPr lang="pt-BR" sz="2800" dirty="0">
+                <a:solidFill>
+                  <a:srgbClr val="FF0000"/>
+                </a:solidFill>
+              </a:rPr>
+              <a:t> </a:t>
+            </a:r>
+            <a:r>
+              <a:rPr lang="pt-BR" sz="2800" dirty="0" err="1">
+                <a:solidFill>
+                  <a:srgbClr val="FF0000"/>
+                </a:solidFill>
+              </a:rPr>
+              <a:t>add</a:t>
+            </a:r>
+            <a:r>
+              <a:rPr lang="pt-BR" sz="2800" dirty="0">
+                <a:solidFill>
+                  <a:srgbClr val="FF0000"/>
+                </a:solidFill>
+              </a:rPr>
+              <a:t> </a:t>
+            </a:r>
+            <a:r>
               <a:rPr lang="pt-BR" sz="2800" dirty="0"/>
-              <a:t> </a:t>
-            </a:r>
-            <a:r>
-              <a:rPr lang="pt-BR" sz="2800" dirty="0" err="1"/>
-              <a:t>remote</a:t>
-            </a:r>
-            <a:r>
-              <a:rPr lang="pt-BR" sz="2800" dirty="0"/>
-              <a:t> </a:t>
-            </a:r>
-            <a:r>
-              <a:rPr lang="pt-BR" sz="2800" dirty="0" err="1"/>
-              <a:t>add</a:t>
-            </a:r>
-            <a:r>
-              <a:rPr lang="pt-BR" sz="2800" dirty="0"/>
-              <a:t> da seguinte maneira: </a:t>
+              <a:t>da seguinte maneira: </a:t>
             </a:r>
           </a:p>
           <a:p>
@@ -8001,21 +8084,24 @@
                   <a:srgbClr val="FF0000"/>
                 </a:solidFill>
               </a:rPr>
-              <a:t> servidor file://</a:t>
+              <a:t> </a:t>
             </a:r>
             <a:r>
               <a:rPr lang="pt-BR" sz="2000" dirty="0">
                 <a:solidFill>
-                  <a:srgbClr val="FF0000"/>
-                </a:solidFill>
-              </a:rPr>
-              <a:t>192.168.1.1/opt/repositorios/moveis-ecologicos.git</a:t>
-            </a:r>
-            <a:endParaRPr lang="pt-BR" sz="2000" dirty="0">
-              <a:solidFill>
-                <a:srgbClr val="FF0000"/>
-              </a:solidFill>
-            </a:endParaRPr>
+                  <a:srgbClr val="002060"/>
+                </a:solidFill>
+              </a:rPr>
+              <a:t>servidor</a:t>
+            </a:r>
+            <a:r>
+              <a:rPr lang="pt-BR" sz="2000" dirty="0">
+                <a:solidFill>
+                  <a:srgbClr val="FF0000"/>
+                </a:solidFill>
+              </a:rPr>
+              <a:t> file://192.168.1.1/opt/repositorios/moveis-ecologicos.git</a:t>
+            </a:r>
           </a:p>
         </p:txBody>
       </p:sp>

</xml_diff>